<commit_message>
added design for loginpage
</commit_message>
<xml_diff>
--- a/Layout.pptx
+++ b/Layout.pptx
@@ -6,6 +6,7 @@
   </p:sldMasterIdLst>
   <p:sldIdLst>
     <p:sldId id="256" r:id="rId2"/>
+    <p:sldId id="257" r:id="rId3"/>
   </p:sldIdLst>
   <p:sldSz cx="12192000" cy="6858000"/>
   <p:notesSz cx="6858000" cy="9144000"/>
@@ -104,7 +105,16 @@
       </a:defRPr>
     </a:lvl9pPr>
   </p:defaultTextStyle>
+  <p:extLst>
+    <p:ext uri="{EFAFB233-063F-42B5-8137-9DF3F51BA10A}">
+      <p15:sldGuideLst xmlns:p15="http://schemas.microsoft.com/office/powerpoint/2012/main"/>
+    </p:ext>
+  </p:extLst>
 </p:presentation>
+</file>
+
+<file path=ppt/revisionInfo.xml><?xml version="1.0" encoding="utf-8"?>
+<p1510:revInfo xmlns:a="http://schemas.openxmlformats.org/drawingml/2006/main" xmlns:r="http://schemas.openxmlformats.org/officeDocument/2006/relationships" xmlns:p1510="http://schemas.microsoft.com/office/powerpoint/2015/10/main"/>
 </file>
 
 <file path=ppt/slideLayouts/slideLayout1.xml><?xml version="1.0" encoding="utf-8"?>
@@ -236,7 +246,7 @@
           <a:p>
             <a:fld id="{CA8D0E8E-87DE-4C0E-A828-F83AE184BF1C}" type="datetimeFigureOut">
               <a:rPr lang="de-DE" smtClean="0"/>
-              <a:t>14.05.2017</a:t>
+              <a:t>15.05.2017</a:t>
             </a:fld>
             <a:endParaRPr lang="de-DE"/>
           </a:p>
@@ -404,7 +414,7 @@
           <a:p>
             <a:fld id="{CA8D0E8E-87DE-4C0E-A828-F83AE184BF1C}" type="datetimeFigureOut">
               <a:rPr lang="de-DE" smtClean="0"/>
-              <a:t>14.05.2017</a:t>
+              <a:t>15.05.2017</a:t>
             </a:fld>
             <a:endParaRPr lang="de-DE"/>
           </a:p>
@@ -582,7 +592,7 @@
           <a:p>
             <a:fld id="{CA8D0E8E-87DE-4C0E-A828-F83AE184BF1C}" type="datetimeFigureOut">
               <a:rPr lang="de-DE" smtClean="0"/>
-              <a:t>14.05.2017</a:t>
+              <a:t>15.05.2017</a:t>
             </a:fld>
             <a:endParaRPr lang="de-DE"/>
           </a:p>
@@ -750,7 +760,7 @@
           <a:p>
             <a:fld id="{CA8D0E8E-87DE-4C0E-A828-F83AE184BF1C}" type="datetimeFigureOut">
               <a:rPr lang="de-DE" smtClean="0"/>
-              <a:t>14.05.2017</a:t>
+              <a:t>15.05.2017</a:t>
             </a:fld>
             <a:endParaRPr lang="de-DE"/>
           </a:p>
@@ -995,7 +1005,7 @@
           <a:p>
             <a:fld id="{CA8D0E8E-87DE-4C0E-A828-F83AE184BF1C}" type="datetimeFigureOut">
               <a:rPr lang="de-DE" smtClean="0"/>
-              <a:t>14.05.2017</a:t>
+              <a:t>15.05.2017</a:t>
             </a:fld>
             <a:endParaRPr lang="de-DE"/>
           </a:p>
@@ -1224,7 +1234,7 @@
           <a:p>
             <a:fld id="{CA8D0E8E-87DE-4C0E-A828-F83AE184BF1C}" type="datetimeFigureOut">
               <a:rPr lang="de-DE" smtClean="0"/>
-              <a:t>14.05.2017</a:t>
+              <a:t>15.05.2017</a:t>
             </a:fld>
             <a:endParaRPr lang="de-DE"/>
           </a:p>
@@ -1588,7 +1598,7 @@
           <a:p>
             <a:fld id="{CA8D0E8E-87DE-4C0E-A828-F83AE184BF1C}" type="datetimeFigureOut">
               <a:rPr lang="de-DE" smtClean="0"/>
-              <a:t>14.05.2017</a:t>
+              <a:t>15.05.2017</a:t>
             </a:fld>
             <a:endParaRPr lang="de-DE"/>
           </a:p>
@@ -1705,7 +1715,7 @@
           <a:p>
             <a:fld id="{CA8D0E8E-87DE-4C0E-A828-F83AE184BF1C}" type="datetimeFigureOut">
               <a:rPr lang="de-DE" smtClean="0"/>
-              <a:t>14.05.2017</a:t>
+              <a:t>15.05.2017</a:t>
             </a:fld>
             <a:endParaRPr lang="de-DE"/>
           </a:p>
@@ -1800,7 +1810,7 @@
           <a:p>
             <a:fld id="{CA8D0E8E-87DE-4C0E-A828-F83AE184BF1C}" type="datetimeFigureOut">
               <a:rPr lang="de-DE" smtClean="0"/>
-              <a:t>14.05.2017</a:t>
+              <a:t>15.05.2017</a:t>
             </a:fld>
             <a:endParaRPr lang="de-DE"/>
           </a:p>
@@ -2075,7 +2085,7 @@
           <a:p>
             <a:fld id="{CA8D0E8E-87DE-4C0E-A828-F83AE184BF1C}" type="datetimeFigureOut">
               <a:rPr lang="de-DE" smtClean="0"/>
-              <a:t>14.05.2017</a:t>
+              <a:t>15.05.2017</a:t>
             </a:fld>
             <a:endParaRPr lang="de-DE"/>
           </a:p>
@@ -2327,7 +2337,7 @@
           <a:p>
             <a:fld id="{CA8D0E8E-87DE-4C0E-A828-F83AE184BF1C}" type="datetimeFigureOut">
               <a:rPr lang="de-DE" smtClean="0"/>
-              <a:t>14.05.2017</a:t>
+              <a:t>15.05.2017</a:t>
             </a:fld>
             <a:endParaRPr lang="de-DE"/>
           </a:p>
@@ -2538,7 +2548,7 @@
           <a:p>
             <a:fld id="{CA8D0E8E-87DE-4C0E-A828-F83AE184BF1C}" type="datetimeFigureOut">
               <a:rPr lang="de-DE" smtClean="0"/>
-              <a:t>14.05.2017</a:t>
+              <a:t>15.05.2017</a:t>
             </a:fld>
             <a:endParaRPr lang="de-DE"/>
           </a:p>
@@ -2951,12 +2961,66 @@
         </p:nvSpPr>
         <p:spPr>
           <a:xfrm>
-            <a:off x="0" y="0"/>
-            <a:ext cx="12192000" cy="620785"/>
+            <a:off x="1484244" y="0"/>
+            <a:ext cx="10707756" cy="620785"/>
           </a:xfrm>
           <a:prstGeom prst="rect">
             <a:avLst/>
           </a:prstGeom>
+          <a:solidFill>
+            <a:srgbClr val="9ABEDF"/>
+          </a:solidFill>
+          <a:ln>
+            <a:solidFill>
+              <a:srgbClr val="9ABEDF"/>
+            </a:solidFill>
+          </a:ln>
+        </p:spPr>
+        <p:style>
+          <a:lnRef idx="2">
+            <a:schemeClr val="accent3"/>
+          </a:lnRef>
+          <a:fillRef idx="1">
+            <a:schemeClr val="lt1"/>
+          </a:fillRef>
+          <a:effectRef idx="0">
+            <a:schemeClr val="accent3"/>
+          </a:effectRef>
+          <a:fontRef idx="minor">
+            <a:schemeClr val="dk1"/>
+          </a:fontRef>
+        </p:style>
+        <p:txBody>
+          <a:bodyPr rtlCol="0" anchor="ctr"/>
+          <a:lstStyle/>
+          <a:p>
+            <a:pPr algn="ctr"/>
+            <a:endParaRPr lang="de-DE"/>
+          </a:p>
+        </p:txBody>
+      </p:sp>
+      <p:sp>
+        <p:nvSpPr>
+          <p:cNvPr id="5" name="Rechteck 4"/>
+          <p:cNvSpPr/>
+          <p:nvPr/>
+        </p:nvSpPr>
+        <p:spPr>
+          <a:xfrm>
+            <a:off x="0" y="6593747"/>
+            <a:ext cx="12192000" cy="264253"/>
+          </a:xfrm>
+          <a:prstGeom prst="rect">
+            <a:avLst/>
+          </a:prstGeom>
+          <a:solidFill>
+            <a:srgbClr val="9ABEDF"/>
+          </a:solidFill>
+          <a:ln>
+            <a:solidFill>
+              <a:srgbClr val="9ABEDF"/>
+            </a:solidFill>
+          </a:ln>
         </p:spPr>
         <p:style>
           <a:lnRef idx="2">
@@ -2985,18 +3049,362 @@
       </p:sp>
       <p:sp>
         <p:nvSpPr>
-          <p:cNvPr id="5" name="Rechteck 4"/>
+          <p:cNvPr id="7" name="Rechteck 6"/>
           <p:cNvSpPr/>
           <p:nvPr/>
         </p:nvSpPr>
         <p:spPr>
           <a:xfrm>
-            <a:off x="0" y="6593747"/>
-            <a:ext cx="12192000" cy="264253"/>
+            <a:off x="2295203" y="142612"/>
+            <a:ext cx="8249570" cy="335559"/>
           </a:xfrm>
           <a:prstGeom prst="rect">
             <a:avLst/>
           </a:prstGeom>
+          <a:ln>
+            <a:solidFill>
+              <a:schemeClr val="tx1"/>
+            </a:solidFill>
+          </a:ln>
+        </p:spPr>
+        <p:style>
+          <a:lnRef idx="2">
+            <a:schemeClr val="accent3"/>
+          </a:lnRef>
+          <a:fillRef idx="1">
+            <a:schemeClr val="lt1"/>
+          </a:fillRef>
+          <a:effectRef idx="0">
+            <a:schemeClr val="accent3"/>
+          </a:effectRef>
+          <a:fontRef idx="minor">
+            <a:schemeClr val="dk1"/>
+          </a:fontRef>
+        </p:style>
+        <p:txBody>
+          <a:bodyPr rtlCol="0" anchor="ctr"/>
+          <a:lstStyle/>
+          <a:p>
+            <a:pPr algn="ctr"/>
+            <a:r>
+              <a:rPr lang="de-DE" dirty="0"/>
+              <a:t>Menü</a:t>
+            </a:r>
+          </a:p>
+        </p:txBody>
+      </p:sp>
+      <p:sp>
+        <p:nvSpPr>
+          <p:cNvPr id="8" name="Rechteck 7"/>
+          <p:cNvSpPr/>
+          <p:nvPr/>
+        </p:nvSpPr>
+        <p:spPr>
+          <a:xfrm>
+            <a:off x="11232859" y="6629399"/>
+            <a:ext cx="864066" cy="192947"/>
+          </a:xfrm>
+          <a:prstGeom prst="rect">
+            <a:avLst/>
+          </a:prstGeom>
+        </p:spPr>
+        <p:style>
+          <a:lnRef idx="2">
+            <a:schemeClr val="dk1"/>
+          </a:lnRef>
+          <a:fillRef idx="1">
+            <a:schemeClr val="lt1"/>
+          </a:fillRef>
+          <a:effectRef idx="0">
+            <a:schemeClr val="dk1"/>
+          </a:effectRef>
+          <a:fontRef idx="minor">
+            <a:schemeClr val="dk1"/>
+          </a:fontRef>
+        </p:style>
+        <p:txBody>
+          <a:bodyPr rtlCol="0" anchor="ctr"/>
+          <a:lstStyle/>
+          <a:p>
+            <a:pPr algn="ctr"/>
+            <a:r>
+              <a:rPr lang="de-DE" dirty="0"/>
+              <a:t>Hilfe</a:t>
+            </a:r>
+          </a:p>
+        </p:txBody>
+      </p:sp>
+      <p:sp>
+        <p:nvSpPr>
+          <p:cNvPr id="9" name="Rechteck 8"/>
+          <p:cNvSpPr/>
+          <p:nvPr/>
+        </p:nvSpPr>
+        <p:spPr>
+          <a:xfrm>
+            <a:off x="9571839" y="6629399"/>
+            <a:ext cx="1560352" cy="192947"/>
+          </a:xfrm>
+          <a:prstGeom prst="rect">
+            <a:avLst/>
+          </a:prstGeom>
+        </p:spPr>
+        <p:style>
+          <a:lnRef idx="2">
+            <a:schemeClr val="dk1"/>
+          </a:lnRef>
+          <a:fillRef idx="1">
+            <a:schemeClr val="lt1"/>
+          </a:fillRef>
+          <a:effectRef idx="0">
+            <a:schemeClr val="dk1"/>
+          </a:effectRef>
+          <a:fontRef idx="minor">
+            <a:schemeClr val="dk1"/>
+          </a:fontRef>
+        </p:style>
+        <p:txBody>
+          <a:bodyPr rtlCol="0" anchor="ctr"/>
+          <a:lstStyle/>
+          <a:p>
+            <a:pPr algn="ctr"/>
+            <a:r>
+              <a:rPr lang="de-DE" dirty="0"/>
+              <a:t>Kontakt/Ticket</a:t>
+            </a:r>
+          </a:p>
+        </p:txBody>
+      </p:sp>
+      <p:sp>
+        <p:nvSpPr>
+          <p:cNvPr id="10" name="Rechteck 9"/>
+          <p:cNvSpPr/>
+          <p:nvPr/>
+        </p:nvSpPr>
+        <p:spPr>
+          <a:xfrm>
+            <a:off x="11006983" y="135272"/>
+            <a:ext cx="1089942" cy="335560"/>
+          </a:xfrm>
+          <a:prstGeom prst="rect">
+            <a:avLst/>
+          </a:prstGeom>
+          <a:ln>
+            <a:solidFill>
+              <a:schemeClr val="tx1"/>
+            </a:solidFill>
+          </a:ln>
+        </p:spPr>
+        <p:style>
+          <a:lnRef idx="2">
+            <a:schemeClr val="dk1"/>
+          </a:lnRef>
+          <a:fillRef idx="1">
+            <a:schemeClr val="lt1"/>
+          </a:fillRef>
+          <a:effectRef idx="0">
+            <a:schemeClr val="dk1"/>
+          </a:effectRef>
+          <a:fontRef idx="minor">
+            <a:schemeClr val="dk1"/>
+          </a:fontRef>
+        </p:style>
+        <p:txBody>
+          <a:bodyPr rtlCol="0" anchor="ctr"/>
+          <a:lstStyle/>
+          <a:p>
+            <a:pPr algn="ctr"/>
+            <a:r>
+              <a:rPr lang="de-DE" dirty="0"/>
+              <a:t>Logout</a:t>
+            </a:r>
+          </a:p>
+        </p:txBody>
+      </p:sp>
+      <p:cxnSp>
+        <p:nvCxnSpPr>
+          <p:cNvPr id="14" name="Gerade Verbindung mit Pfeil 13"/>
+          <p:cNvCxnSpPr>
+            <a:cxnSpLocks/>
+          </p:cNvCxnSpPr>
+          <p:nvPr/>
+        </p:nvCxnSpPr>
+        <p:spPr>
+          <a:xfrm flipH="1" flipV="1">
+            <a:off x="1040235" y="377507"/>
+            <a:ext cx="792759" cy="519801"/>
+          </a:xfrm>
+          <a:prstGeom prst="straightConnector1">
+            <a:avLst/>
+          </a:prstGeom>
+          <a:ln>
+            <a:tailEnd type="triangle"/>
+          </a:ln>
+        </p:spPr>
+        <p:style>
+          <a:lnRef idx="3">
+            <a:schemeClr val="accent2"/>
+          </a:lnRef>
+          <a:fillRef idx="0">
+            <a:schemeClr val="accent2"/>
+          </a:fillRef>
+          <a:effectRef idx="2">
+            <a:schemeClr val="accent2"/>
+          </a:effectRef>
+          <a:fontRef idx="minor">
+            <a:schemeClr val="tx1"/>
+          </a:fontRef>
+        </p:style>
+      </p:cxnSp>
+      <p:sp>
+        <p:nvSpPr>
+          <p:cNvPr id="15" name="Rechteck 14"/>
+          <p:cNvSpPr/>
+          <p:nvPr/>
+        </p:nvSpPr>
+        <p:spPr>
+          <a:xfrm>
+            <a:off x="1356430" y="865127"/>
+            <a:ext cx="2040820" cy="523220"/>
+          </a:xfrm>
+          <a:prstGeom prst="rect">
+            <a:avLst/>
+          </a:prstGeom>
+          <a:noFill/>
+        </p:spPr>
+        <p:txBody>
+          <a:bodyPr wrap="square" lIns="91440" tIns="45720" rIns="91440" bIns="45720">
+            <a:spAutoFit/>
+          </a:bodyPr>
+          <a:lstStyle/>
+          <a:p>
+            <a:pPr algn="ctr"/>
+            <a:r>
+              <a:rPr lang="de-DE" sz="1400" b="0" cap="none" spc="0" dirty="0">
+                <a:ln w="0"/>
+                <a:solidFill>
+                  <a:schemeClr val="tx1"/>
+                </a:solidFill>
+                <a:effectLst>
+                  <a:outerShdw blurRad="38100" dist="19050" dir="2700000" algn="tl" rotWithShape="0">
+                    <a:schemeClr val="dk1">
+                      <a:alpha val="40000"/>
+                    </a:schemeClr>
+                  </a:outerShdw>
+                </a:effectLst>
+              </a:rPr>
+              <a:t>beim Klicken zurück zur Startseite</a:t>
+            </a:r>
+          </a:p>
+        </p:txBody>
+      </p:sp>
+      <p:cxnSp>
+        <p:nvCxnSpPr>
+          <p:cNvPr id="17" name="Gerade Verbindung mit Pfeil 16"/>
+          <p:cNvCxnSpPr/>
+          <p:nvPr/>
+        </p:nvCxnSpPr>
+        <p:spPr>
+          <a:xfrm>
+            <a:off x="11132191" y="5998128"/>
+            <a:ext cx="260059" cy="727744"/>
+          </a:xfrm>
+          <a:prstGeom prst="straightConnector1">
+            <a:avLst/>
+          </a:prstGeom>
+          <a:ln>
+            <a:tailEnd type="triangle"/>
+          </a:ln>
+        </p:spPr>
+        <p:style>
+          <a:lnRef idx="3">
+            <a:schemeClr val="accent2"/>
+          </a:lnRef>
+          <a:fillRef idx="0">
+            <a:schemeClr val="accent2"/>
+          </a:fillRef>
+          <a:effectRef idx="2">
+            <a:schemeClr val="accent2"/>
+          </a:effectRef>
+          <a:fontRef idx="minor">
+            <a:schemeClr val="tx1"/>
+          </a:fontRef>
+        </p:style>
+      </p:cxnSp>
+      <p:sp>
+        <p:nvSpPr>
+          <p:cNvPr id="18" name="Rechteck 17"/>
+          <p:cNvSpPr/>
+          <p:nvPr/>
+        </p:nvSpPr>
+        <p:spPr>
+          <a:xfrm>
+            <a:off x="9635403" y="5690351"/>
+            <a:ext cx="2556597" cy="307777"/>
+          </a:xfrm>
+          <a:prstGeom prst="rect">
+            <a:avLst/>
+          </a:prstGeom>
+          <a:noFill/>
+        </p:spPr>
+        <p:txBody>
+          <a:bodyPr wrap="none" lIns="91440" tIns="45720" rIns="91440" bIns="45720">
+            <a:spAutoFit/>
+          </a:bodyPr>
+          <a:lstStyle/>
+          <a:p>
+            <a:pPr algn="ctr"/>
+            <a:r>
+              <a:rPr lang="de-DE" sz="1400" dirty="0">
+                <a:ln w="0"/>
+                <a:effectLst>
+                  <a:outerShdw blurRad="38100" dist="19050" dir="2700000" algn="tl" rotWithShape="0">
+                    <a:schemeClr val="dk1">
+                      <a:alpha val="40000"/>
+                    </a:schemeClr>
+                  </a:outerShdw>
+                </a:effectLst>
+              </a:rPr>
+              <a:t>Popup für seitenspezifische Hilfe</a:t>
+            </a:r>
+            <a:endParaRPr lang="de-DE" sz="1400" b="0" cap="none" spc="0" dirty="0">
+              <a:ln w="0"/>
+              <a:solidFill>
+                <a:schemeClr val="tx1"/>
+              </a:solidFill>
+              <a:effectLst>
+                <a:outerShdw blurRad="38100" dist="19050" dir="2700000" algn="tl" rotWithShape="0">
+                  <a:schemeClr val="dk1">
+                    <a:alpha val="40000"/>
+                  </a:schemeClr>
+                </a:outerShdw>
+              </a:effectLst>
+            </a:endParaRPr>
+          </a:p>
+        </p:txBody>
+      </p:sp>
+      <p:sp>
+        <p:nvSpPr>
+          <p:cNvPr id="20" name="Rechteck 19"/>
+          <p:cNvSpPr/>
+          <p:nvPr/>
+        </p:nvSpPr>
+        <p:spPr>
+          <a:xfrm>
+            <a:off x="0" y="620785"/>
+            <a:ext cx="1262543" cy="5972962"/>
+          </a:xfrm>
+          <a:prstGeom prst="rect">
+            <a:avLst/>
+          </a:prstGeom>
+          <a:solidFill>
+            <a:srgbClr val="9ABEDF"/>
+          </a:solidFill>
+          <a:ln>
+            <a:solidFill>
+              <a:srgbClr val="9ABEDF"/>
+            </a:solidFill>
+          </a:ln>
         </p:spPr>
         <p:style>
           <a:lnRef idx="2">
@@ -3025,14 +3433,14 @@
       </p:sp>
       <p:sp>
         <p:nvSpPr>
-          <p:cNvPr id="6" name="Rechteck 5"/>
+          <p:cNvPr id="22" name="Rechteck 21"/>
           <p:cNvSpPr/>
           <p:nvPr/>
         </p:nvSpPr>
         <p:spPr>
           <a:xfrm>
-            <a:off x="134224" y="100668"/>
-            <a:ext cx="1132514" cy="411060"/>
+            <a:off x="134224" y="1008404"/>
+            <a:ext cx="906011" cy="5477854"/>
           </a:xfrm>
           <a:prstGeom prst="rect">
             <a:avLst/>
@@ -3040,18 +3448,16 @@
         </p:spPr>
         <p:style>
           <a:lnRef idx="2">
-            <a:schemeClr val="accent4">
-              <a:shade val="50000"/>
-            </a:schemeClr>
+            <a:schemeClr val="dk1"/>
           </a:lnRef>
           <a:fillRef idx="1">
-            <a:schemeClr val="accent4"/>
+            <a:schemeClr val="lt1"/>
           </a:fillRef>
           <a:effectRef idx="0">
-            <a:schemeClr val="accent4"/>
+            <a:schemeClr val="dk1"/>
           </a:effectRef>
           <a:fontRef idx="minor">
-            <a:schemeClr val="lt1"/>
+            <a:schemeClr val="dk1"/>
           </a:fontRef>
         </p:style>
         <p:txBody>
@@ -3060,200 +3466,67 @@
           <a:p>
             <a:pPr algn="ctr"/>
             <a:r>
-              <a:rPr lang="de-DE" dirty="0">
+              <a:rPr lang="de-DE" dirty="0"/>
+              <a:t>Unter-menüs</a:t>
+            </a:r>
+          </a:p>
+        </p:txBody>
+      </p:sp>
+      <p:sp>
+        <p:nvSpPr>
+          <p:cNvPr id="23" name="Rechteck 22"/>
+          <p:cNvSpPr/>
+          <p:nvPr/>
+        </p:nvSpPr>
+        <p:spPr>
+          <a:xfrm>
+            <a:off x="134224" y="6629399"/>
+            <a:ext cx="1498023" cy="192947"/>
+          </a:xfrm>
+          <a:prstGeom prst="rect">
+            <a:avLst/>
+          </a:prstGeom>
+        </p:spPr>
+        <p:style>
+          <a:lnRef idx="2">
+            <a:schemeClr val="dk1"/>
+          </a:lnRef>
+          <a:fillRef idx="1">
+            <a:schemeClr val="lt1"/>
+          </a:fillRef>
+          <a:effectRef idx="0">
+            <a:schemeClr val="dk1"/>
+          </a:effectRef>
+          <a:fontRef idx="minor">
+            <a:schemeClr val="dk1"/>
+          </a:fontRef>
+        </p:style>
+        <p:txBody>
+          <a:bodyPr rtlCol="0" anchor="ctr"/>
+          <a:lstStyle/>
+          <a:p>
+            <a:pPr algn="ctr"/>
+            <a:r>
+              <a:rPr lang="de-DE" sz="1400" dirty="0">
                 <a:solidFill>
                   <a:schemeClr val="tx1"/>
                 </a:solidFill>
               </a:rPr>
-              <a:t>Logo</a:t>
-            </a:r>
-          </a:p>
-        </p:txBody>
-      </p:sp>
-      <p:sp>
-        <p:nvSpPr>
-          <p:cNvPr id="7" name="Rechteck 6"/>
-          <p:cNvSpPr/>
-          <p:nvPr/>
-        </p:nvSpPr>
-        <p:spPr>
-          <a:xfrm>
-            <a:off x="2295203" y="142612"/>
-            <a:ext cx="8249570" cy="335559"/>
-          </a:xfrm>
-          <a:prstGeom prst="rect">
-            <a:avLst/>
-          </a:prstGeom>
-        </p:spPr>
-        <p:style>
-          <a:lnRef idx="2">
-            <a:schemeClr val="accent6">
-              <a:shade val="50000"/>
-            </a:schemeClr>
-          </a:lnRef>
-          <a:fillRef idx="1">
-            <a:schemeClr val="accent6"/>
-          </a:fillRef>
-          <a:effectRef idx="0">
-            <a:schemeClr val="accent6"/>
-          </a:effectRef>
-          <a:fontRef idx="minor">
-            <a:schemeClr val="lt1"/>
-          </a:fontRef>
-        </p:style>
-        <p:txBody>
-          <a:bodyPr rtlCol="0" anchor="ctr"/>
-          <a:lstStyle/>
-          <a:p>
-            <a:pPr algn="ctr"/>
-            <a:r>
-              <a:rPr lang="de-DE" dirty="0"/>
-              <a:t>Menü</a:t>
-            </a:r>
-          </a:p>
-        </p:txBody>
-      </p:sp>
-      <p:sp>
-        <p:nvSpPr>
-          <p:cNvPr id="8" name="Rechteck 7"/>
-          <p:cNvSpPr/>
-          <p:nvPr/>
-        </p:nvSpPr>
-        <p:spPr>
-          <a:xfrm>
-            <a:off x="11232859" y="6629399"/>
-            <a:ext cx="864066" cy="192947"/>
-          </a:xfrm>
-          <a:prstGeom prst="rect">
-            <a:avLst/>
-          </a:prstGeom>
-        </p:spPr>
-        <p:style>
-          <a:lnRef idx="2">
-            <a:schemeClr val="accent6">
-              <a:shade val="50000"/>
-            </a:schemeClr>
-          </a:lnRef>
-          <a:fillRef idx="1">
-            <a:schemeClr val="accent6"/>
-          </a:fillRef>
-          <a:effectRef idx="0">
-            <a:schemeClr val="accent6"/>
-          </a:effectRef>
-          <a:fontRef idx="minor">
-            <a:schemeClr val="lt1"/>
-          </a:fontRef>
-        </p:style>
-        <p:txBody>
-          <a:bodyPr rtlCol="0" anchor="ctr"/>
-          <a:lstStyle/>
-          <a:p>
-            <a:pPr algn="ctr"/>
-            <a:r>
-              <a:rPr lang="de-DE" dirty="0"/>
-              <a:t>Hilfe</a:t>
-            </a:r>
-          </a:p>
-        </p:txBody>
-      </p:sp>
-      <p:sp>
-        <p:nvSpPr>
-          <p:cNvPr id="9" name="Rechteck 8"/>
-          <p:cNvSpPr/>
-          <p:nvPr/>
-        </p:nvSpPr>
-        <p:spPr>
-          <a:xfrm>
-            <a:off x="9571839" y="6629399"/>
-            <a:ext cx="1560352" cy="192947"/>
-          </a:xfrm>
-          <a:prstGeom prst="rect">
-            <a:avLst/>
-          </a:prstGeom>
-        </p:spPr>
-        <p:style>
-          <a:lnRef idx="2">
-            <a:schemeClr val="accent6">
-              <a:shade val="50000"/>
-            </a:schemeClr>
-          </a:lnRef>
-          <a:fillRef idx="1">
-            <a:schemeClr val="accent6"/>
-          </a:fillRef>
-          <a:effectRef idx="0">
-            <a:schemeClr val="accent6"/>
-          </a:effectRef>
-          <a:fontRef idx="minor">
-            <a:schemeClr val="lt1"/>
-          </a:fontRef>
-        </p:style>
-        <p:txBody>
-          <a:bodyPr rtlCol="0" anchor="ctr"/>
-          <a:lstStyle/>
-          <a:p>
-            <a:pPr algn="ctr"/>
-            <a:r>
-              <a:rPr lang="de-DE" dirty="0"/>
-              <a:t>Kontakt/Ticket</a:t>
-            </a:r>
-          </a:p>
-        </p:txBody>
-      </p:sp>
-      <p:sp>
-        <p:nvSpPr>
-          <p:cNvPr id="10" name="Rechteck 9"/>
-          <p:cNvSpPr/>
-          <p:nvPr/>
-        </p:nvSpPr>
-        <p:spPr>
-          <a:xfrm>
-            <a:off x="11006983" y="135272"/>
-            <a:ext cx="1089942" cy="335560"/>
-          </a:xfrm>
-          <a:prstGeom prst="rect">
-            <a:avLst/>
-          </a:prstGeom>
-        </p:spPr>
-        <p:style>
-          <a:lnRef idx="2">
-            <a:schemeClr val="accent6">
-              <a:shade val="50000"/>
-            </a:schemeClr>
-          </a:lnRef>
-          <a:fillRef idx="1">
-            <a:schemeClr val="accent6"/>
-          </a:fillRef>
-          <a:effectRef idx="0">
-            <a:schemeClr val="accent6"/>
-          </a:effectRef>
-          <a:fontRef idx="minor">
-            <a:schemeClr val="lt1"/>
-          </a:fontRef>
-        </p:style>
-        <p:txBody>
-          <a:bodyPr rtlCol="0" anchor="ctr"/>
-          <a:lstStyle/>
-          <a:p>
-            <a:pPr algn="ctr"/>
-            <a:r>
-              <a:rPr lang="de-DE" dirty="0"/>
-              <a:t>Login</a:t>
+              <a:t>Link zur Schul-HP</a:t>
             </a:r>
           </a:p>
         </p:txBody>
       </p:sp>
       <p:cxnSp>
         <p:nvCxnSpPr>
-          <p:cNvPr id="14" name="Gerade Verbindung mit Pfeil 13"/>
-          <p:cNvCxnSpPr>
-            <a:cxnSpLocks/>
-          </p:cNvCxnSpPr>
+          <p:cNvPr id="25" name="Gerade Verbindung mit Pfeil 24"/>
+          <p:cNvCxnSpPr/>
           <p:nvPr/>
         </p:nvCxnSpPr>
         <p:spPr>
-          <a:xfrm flipH="1" flipV="1">
-            <a:off x="1040235" y="377507"/>
-            <a:ext cx="792759" cy="519801"/>
+          <a:xfrm flipV="1">
+            <a:off x="11291582" y="377507"/>
+            <a:ext cx="100668" cy="949285"/>
           </a:xfrm>
           <a:prstGeom prst="straightConnector1">
             <a:avLst/>
@@ -3279,14 +3552,14 @@
       </p:cxnSp>
       <p:sp>
         <p:nvSpPr>
-          <p:cNvPr id="15" name="Rechteck 14"/>
+          <p:cNvPr id="26" name="Rechteck 25"/>
           <p:cNvSpPr/>
           <p:nvPr/>
         </p:nvSpPr>
         <p:spPr>
           <a:xfrm>
-            <a:off x="1356430" y="865127"/>
-            <a:ext cx="2040820" cy="461665"/>
+            <a:off x="10429337" y="1291847"/>
+            <a:ext cx="1762663" cy="523220"/>
           </a:xfrm>
           <a:prstGeom prst="rect">
             <a:avLst/>
@@ -3294,18 +3567,15 @@
           <a:noFill/>
         </p:spPr>
         <p:txBody>
-          <a:bodyPr wrap="square" lIns="91440" tIns="45720" rIns="91440" bIns="45720">
+          <a:bodyPr wrap="none" lIns="91440" tIns="45720" rIns="91440" bIns="45720">
             <a:spAutoFit/>
           </a:bodyPr>
           <a:lstStyle/>
           <a:p>
             <a:pPr algn="ctr"/>
             <a:r>
-              <a:rPr lang="de-DE" sz="1200" b="0" cap="none" spc="0" dirty="0">
+              <a:rPr lang="de-DE" sz="1400" b="0" cap="none" spc="0" dirty="0">
                 <a:ln w="0"/>
-                <a:solidFill>
-                  <a:schemeClr val="tx1"/>
-                </a:solidFill>
                 <a:effectLst>
                   <a:outerShdw blurRad="38100" dist="19050" dir="2700000" algn="tl" rotWithShape="0">
                     <a:schemeClr val="dk1">
@@ -3314,73 +3584,14 @@
                   </a:outerShdw>
                 </a:effectLst>
               </a:rPr>
-              <a:t>beim Klicken zurück zur Startseite</a:t>
-            </a:r>
-          </a:p>
-        </p:txBody>
-      </p:sp>
-      <p:cxnSp>
-        <p:nvCxnSpPr>
-          <p:cNvPr id="17" name="Gerade Verbindung mit Pfeil 16"/>
-          <p:cNvCxnSpPr/>
-          <p:nvPr/>
-        </p:nvCxnSpPr>
-        <p:spPr>
-          <a:xfrm>
-            <a:off x="11132191" y="5998128"/>
-            <a:ext cx="260059" cy="727744"/>
-          </a:xfrm>
-          <a:prstGeom prst="straightConnector1">
-            <a:avLst/>
-          </a:prstGeom>
-          <a:ln>
-            <a:tailEnd type="triangle"/>
-          </a:ln>
-        </p:spPr>
-        <p:style>
-          <a:lnRef idx="3">
-            <a:schemeClr val="accent2"/>
-          </a:lnRef>
-          <a:fillRef idx="0">
-            <a:schemeClr val="accent2"/>
-          </a:fillRef>
-          <a:effectRef idx="2">
-            <a:schemeClr val="accent2"/>
-          </a:effectRef>
-          <a:fontRef idx="minor">
-            <a:schemeClr val="tx1"/>
-          </a:fontRef>
-        </p:style>
-      </p:cxnSp>
-      <p:sp>
-        <p:nvSpPr>
-          <p:cNvPr id="18" name="Rechteck 17"/>
-          <p:cNvSpPr/>
-          <p:nvPr/>
-        </p:nvSpPr>
-        <p:spPr>
-          <a:xfrm>
-            <a:off x="10086759" y="5553241"/>
-            <a:ext cx="2010166" cy="461665"/>
-          </a:xfrm>
-          <a:prstGeom prst="rect">
-            <a:avLst/>
-          </a:prstGeom>
-          <a:noFill/>
-        </p:spPr>
-        <p:txBody>
-          <a:bodyPr wrap="none" lIns="91440" tIns="45720" rIns="91440" bIns="45720">
-            <a:spAutoFit/>
-          </a:bodyPr>
-          <a:lstStyle/>
+              <a:t>Keine Registrierung, </a:t>
+            </a:r>
+          </a:p>
           <a:p>
             <a:pPr algn="ctr"/>
             <a:r>
-              <a:rPr lang="de-DE" sz="1200" b="0" cap="none" spc="0" dirty="0">
+              <a:rPr lang="de-DE" sz="1400" b="0" cap="none" spc="0" dirty="0">
                 <a:ln w="0"/>
-                <a:solidFill>
-                  <a:schemeClr val="tx1"/>
-                </a:solidFill>
                 <a:effectLst>
                   <a:outerShdw blurRad="38100" dist="19050" dir="2700000" algn="tl" rotWithShape="0">
                     <a:schemeClr val="dk1">
@@ -3389,44 +3600,93 @@
                   </a:outerShdw>
                 </a:effectLst>
               </a:rPr>
-              <a:t>Seite mit kurzen Erklärungen </a:t>
-            </a:r>
-          </a:p>
-          <a:p>
-            <a:pPr algn="ctr"/>
-            <a:r>
-              <a:rPr lang="de-DE" sz="1200" b="0" cap="none" spc="0" dirty="0">
-                <a:ln w="0"/>
-                <a:solidFill>
-                  <a:schemeClr val="tx1"/>
-                </a:solidFill>
-                <a:effectLst>
-                  <a:outerShdw blurRad="38100" dist="19050" dir="2700000" algn="tl" rotWithShape="0">
-                    <a:schemeClr val="dk1">
-                      <a:alpha val="40000"/>
-                    </a:schemeClr>
-                  </a:outerShdw>
-                </a:effectLst>
-              </a:rPr>
-              <a:t>zu bestimmten Optionen</a:t>
-            </a:r>
-          </a:p>
-        </p:txBody>
-      </p:sp>
-      <p:sp>
-        <p:nvSpPr>
-          <p:cNvPr id="20" name="Rechteck 19"/>
-          <p:cNvSpPr/>
+              <a:t>weil Sicherheitslücke!</a:t>
+            </a:r>
+          </a:p>
+        </p:txBody>
+      </p:sp>
+      <p:pic>
+        <p:nvPicPr>
+          <p:cNvPr id="3" name="Grafik 2"/>
+          <p:cNvPicPr>
+            <a:picLocks noChangeAspect="1"/>
+          </p:cNvPicPr>
           <p:nvPr/>
-        </p:nvSpPr>
-        <p:spPr>
-          <a:xfrm>
-            <a:off x="0" y="620785"/>
-            <a:ext cx="1262543" cy="5972962"/>
+        </p:nvPicPr>
+        <p:blipFill>
+          <a:blip r:embed="rId2">
+            <a:extLst>
+              <a:ext uri="{28A0092B-C50C-407E-A947-70E740481C1C}">
+                <a14:useLocalDpi xmlns:a14="http://schemas.microsoft.com/office/drawing/2010/main" val="0"/>
+              </a:ext>
+            </a:extLst>
+          </a:blip>
+          <a:stretch>
+            <a:fillRect/>
+          </a:stretch>
+        </p:blipFill>
+        <p:spPr>
+          <a:xfrm>
+            <a:off x="210281" y="63397"/>
+            <a:ext cx="1130694" cy="493394"/>
           </a:xfrm>
           <a:prstGeom prst="rect">
             <a:avLst/>
           </a:prstGeom>
+        </p:spPr>
+      </p:pic>
+    </p:spTree>
+    <p:extLst>
+      <p:ext uri="{BB962C8B-B14F-4D97-AF65-F5344CB8AC3E}">
+        <p14:creationId xmlns:p14="http://schemas.microsoft.com/office/powerpoint/2010/main" val="2493101858"/>
+      </p:ext>
+    </p:extLst>
+  </p:cSld>
+  <p:clrMapOvr>
+    <a:masterClrMapping/>
+  </p:clrMapOvr>
+</p:sld>
+</file>
+
+<file path=ppt/slides/slide2.xml><?xml version="1.0" encoding="utf-8"?>
+<p:sld xmlns:a="http://schemas.openxmlformats.org/drawingml/2006/main" xmlns:r="http://schemas.openxmlformats.org/officeDocument/2006/relationships" xmlns:p="http://schemas.openxmlformats.org/presentationml/2006/main">
+  <p:cSld>
+    <p:spTree>
+      <p:nvGrpSpPr>
+        <p:cNvPr id="1" name=""/>
+        <p:cNvGrpSpPr/>
+        <p:nvPr/>
+      </p:nvGrpSpPr>
+      <p:grpSpPr>
+        <a:xfrm>
+          <a:off x="0" y="0"/>
+          <a:ext cx="0" cy="0"/>
+          <a:chOff x="0" y="0"/>
+          <a:chExt cx="0" cy="0"/>
+        </a:xfrm>
+      </p:grpSpPr>
+      <p:sp>
+        <p:nvSpPr>
+          <p:cNvPr id="5" name="Rechteck 4"/>
+          <p:cNvSpPr/>
+          <p:nvPr/>
+        </p:nvSpPr>
+        <p:spPr>
+          <a:xfrm>
+            <a:off x="0" y="6593747"/>
+            <a:ext cx="12192000" cy="264253"/>
+          </a:xfrm>
+          <a:prstGeom prst="rect">
+            <a:avLst/>
+          </a:prstGeom>
+          <a:solidFill>
+            <a:srgbClr val="9ABEDF"/>
+          </a:solidFill>
+          <a:ln>
+            <a:solidFill>
+              <a:srgbClr val="9ABEDF"/>
+            </a:solidFill>
+          </a:ln>
         </p:spPr>
         <p:style>
           <a:lnRef idx="2">
@@ -3455,14 +3715,14 @@
       </p:sp>
       <p:sp>
         <p:nvSpPr>
-          <p:cNvPr id="22" name="Rechteck 21"/>
+          <p:cNvPr id="8" name="Rechteck 7"/>
           <p:cNvSpPr/>
           <p:nvPr/>
         </p:nvSpPr>
         <p:spPr>
           <a:xfrm>
-            <a:off x="134224" y="1008404"/>
-            <a:ext cx="906011" cy="5477854"/>
+            <a:off x="11232859" y="6629399"/>
+            <a:ext cx="864066" cy="192947"/>
           </a:xfrm>
           <a:prstGeom prst="rect">
             <a:avLst/>
@@ -3470,18 +3730,16 @@
         </p:spPr>
         <p:style>
           <a:lnRef idx="2">
-            <a:schemeClr val="accent6">
-              <a:shade val="50000"/>
-            </a:schemeClr>
+            <a:schemeClr val="dk1"/>
           </a:lnRef>
           <a:fillRef idx="1">
-            <a:schemeClr val="accent6"/>
+            <a:schemeClr val="lt1"/>
           </a:fillRef>
           <a:effectRef idx="0">
-            <a:schemeClr val="accent6"/>
+            <a:schemeClr val="dk1"/>
           </a:effectRef>
           <a:fontRef idx="minor">
-            <a:schemeClr val="lt1"/>
+            <a:schemeClr val="dk1"/>
           </a:fontRef>
         </p:style>
         <p:txBody>
@@ -3491,7 +3749,48 @@
             <a:pPr algn="ctr"/>
             <a:r>
               <a:rPr lang="de-DE" dirty="0"/>
-              <a:t>Unter-menüs</a:t>
+              <a:t>Hilfe</a:t>
+            </a:r>
+          </a:p>
+        </p:txBody>
+      </p:sp>
+      <p:sp>
+        <p:nvSpPr>
+          <p:cNvPr id="9" name="Rechteck 8"/>
+          <p:cNvSpPr/>
+          <p:nvPr/>
+        </p:nvSpPr>
+        <p:spPr>
+          <a:xfrm>
+            <a:off x="9571839" y="6629399"/>
+            <a:ext cx="1560352" cy="192947"/>
+          </a:xfrm>
+          <a:prstGeom prst="rect">
+            <a:avLst/>
+          </a:prstGeom>
+        </p:spPr>
+        <p:style>
+          <a:lnRef idx="2">
+            <a:schemeClr val="dk1"/>
+          </a:lnRef>
+          <a:fillRef idx="1">
+            <a:schemeClr val="lt1"/>
+          </a:fillRef>
+          <a:effectRef idx="0">
+            <a:schemeClr val="dk1"/>
+          </a:effectRef>
+          <a:fontRef idx="minor">
+            <a:schemeClr val="dk1"/>
+          </a:fontRef>
+        </p:style>
+        <p:txBody>
+          <a:bodyPr rtlCol="0" anchor="ctr"/>
+          <a:lstStyle/>
+          <a:p>
+            <a:pPr algn="ctr"/>
+            <a:r>
+              <a:rPr lang="de-DE" dirty="0"/>
+              <a:t>Kontakt/Ticket</a:t>
             </a:r>
           </a:p>
         </p:txBody>
@@ -3513,18 +3812,16 @@
         </p:spPr>
         <p:style>
           <a:lnRef idx="2">
-            <a:schemeClr val="accent4">
-              <a:shade val="50000"/>
-            </a:schemeClr>
+            <a:schemeClr val="dk1"/>
           </a:lnRef>
           <a:fillRef idx="1">
-            <a:schemeClr val="accent4"/>
+            <a:schemeClr val="lt1"/>
           </a:fillRef>
           <a:effectRef idx="0">
-            <a:schemeClr val="accent4"/>
+            <a:schemeClr val="dk1"/>
           </a:effectRef>
           <a:fontRef idx="minor">
-            <a:schemeClr val="lt1"/>
+            <a:schemeClr val="dk1"/>
           </a:fontRef>
         </p:style>
         <p:txBody>
@@ -3543,49 +3840,102 @@
           </a:p>
         </p:txBody>
       </p:sp>
-      <p:cxnSp>
-        <p:nvCxnSpPr>
-          <p:cNvPr id="25" name="Gerade Verbindung mit Pfeil 24"/>
-          <p:cNvCxnSpPr/>
+      <p:sp>
+        <p:nvSpPr>
+          <p:cNvPr id="2" name="Rechteck 1"/>
+          <p:cNvSpPr/>
           <p:nvPr/>
-        </p:nvCxnSpPr>
-        <p:spPr>
-          <a:xfrm flipV="1">
-            <a:off x="11291582" y="377507"/>
-            <a:ext cx="100668" cy="949285"/>
-          </a:xfrm>
-          <a:prstGeom prst="straightConnector1">
+        </p:nvSpPr>
+        <p:spPr>
+          <a:xfrm>
+            <a:off x="3061252" y="2623930"/>
+            <a:ext cx="4055165" cy="357809"/>
+          </a:xfrm>
+          <a:prstGeom prst="rect">
             <a:avLst/>
           </a:prstGeom>
           <a:ln>
-            <a:tailEnd type="triangle"/>
+            <a:solidFill>
+              <a:schemeClr val="tx1"/>
+            </a:solidFill>
           </a:ln>
         </p:spPr>
         <p:style>
-          <a:lnRef idx="3">
-            <a:schemeClr val="accent2"/>
+          <a:lnRef idx="2">
+            <a:schemeClr val="accent6"/>
           </a:lnRef>
-          <a:fillRef idx="0">
-            <a:schemeClr val="accent2"/>
+          <a:fillRef idx="1">
+            <a:schemeClr val="lt1"/>
           </a:fillRef>
-          <a:effectRef idx="2">
-            <a:schemeClr val="accent2"/>
+          <a:effectRef idx="0">
+            <a:schemeClr val="accent6"/>
           </a:effectRef>
           <a:fontRef idx="minor">
-            <a:schemeClr val="tx1"/>
+            <a:schemeClr val="dk1"/>
           </a:fontRef>
         </p:style>
-      </p:cxnSp>
-      <p:sp>
-        <p:nvSpPr>
-          <p:cNvPr id="26" name="Rechteck 25"/>
+        <p:txBody>
+          <a:bodyPr rtlCol="0" anchor="ctr"/>
+          <a:lstStyle/>
+          <a:p>
+            <a:pPr algn="ctr"/>
+            <a:endParaRPr lang="de-DE"/>
+          </a:p>
+        </p:txBody>
+      </p:sp>
+      <p:sp>
+        <p:nvSpPr>
+          <p:cNvPr id="19" name="Rechteck 18"/>
           <p:cNvSpPr/>
           <p:nvPr/>
         </p:nvSpPr>
         <p:spPr>
           <a:xfrm>
-            <a:off x="10150817" y="1203448"/>
-            <a:ext cx="1536125" cy="461665"/>
+            <a:off x="3061252" y="3607266"/>
+            <a:ext cx="4055165" cy="357809"/>
+          </a:xfrm>
+          <a:prstGeom prst="rect">
+            <a:avLst/>
+          </a:prstGeom>
+          <a:ln>
+            <a:solidFill>
+              <a:schemeClr val="tx1"/>
+            </a:solidFill>
+          </a:ln>
+        </p:spPr>
+        <p:style>
+          <a:lnRef idx="2">
+            <a:schemeClr val="accent6"/>
+          </a:lnRef>
+          <a:fillRef idx="1">
+            <a:schemeClr val="lt1"/>
+          </a:fillRef>
+          <a:effectRef idx="0">
+            <a:schemeClr val="accent6"/>
+          </a:effectRef>
+          <a:fontRef idx="minor">
+            <a:schemeClr val="dk1"/>
+          </a:fontRef>
+        </p:style>
+        <p:txBody>
+          <a:bodyPr rtlCol="0" anchor="ctr"/>
+          <a:lstStyle/>
+          <a:p>
+            <a:pPr algn="ctr"/>
+            <a:endParaRPr lang="de-DE" dirty="0"/>
+          </a:p>
+        </p:txBody>
+      </p:sp>
+      <p:sp>
+        <p:nvSpPr>
+          <p:cNvPr id="3" name="Rechteck 2"/>
+          <p:cNvSpPr/>
+          <p:nvPr/>
+        </p:nvSpPr>
+        <p:spPr>
+          <a:xfrm>
+            <a:off x="1352193" y="1008404"/>
+            <a:ext cx="1619409" cy="646331"/>
           </a:xfrm>
           <a:prstGeom prst="rect">
             <a:avLst/>
@@ -3593,14 +3943,14 @@
           <a:noFill/>
         </p:spPr>
         <p:txBody>
-          <a:bodyPr wrap="none" lIns="91440" tIns="45720" rIns="91440" bIns="45720">
+          <a:bodyPr wrap="square" lIns="91440" tIns="45720" rIns="91440" bIns="45720">
             <a:spAutoFit/>
           </a:bodyPr>
           <a:lstStyle/>
           <a:p>
             <a:pPr algn="ctr"/>
             <a:r>
-              <a:rPr lang="de-DE" sz="1200" b="0" cap="none" spc="0" dirty="0">
+              <a:rPr lang="de-DE" sz="3600" dirty="0">
                 <a:ln w="0"/>
                 <a:effectLst>
                   <a:outerShdw blurRad="38100" dist="19050" dir="2700000" algn="tl" rotWithShape="0">
@@ -3610,13 +3960,49 @@
                   </a:outerShdw>
                 </a:effectLst>
               </a:rPr>
-              <a:t>Keine Registrierung, </a:t>
-            </a:r>
-          </a:p>
+              <a:t>Login</a:t>
+            </a:r>
+            <a:endParaRPr lang="de-DE" sz="3600" b="0" cap="none" spc="0" dirty="0">
+              <a:ln w="0"/>
+              <a:solidFill>
+                <a:schemeClr val="tx1"/>
+              </a:solidFill>
+              <a:effectLst>
+                <a:outerShdw blurRad="38100" dist="19050" dir="2700000" algn="tl" rotWithShape="0">
+                  <a:schemeClr val="dk1">
+                    <a:alpha val="40000"/>
+                  </a:schemeClr>
+                </a:outerShdw>
+              </a:effectLst>
+            </a:endParaRPr>
+          </a:p>
+        </p:txBody>
+      </p:sp>
+      <p:sp>
+        <p:nvSpPr>
+          <p:cNvPr id="24" name="Rechteck 23"/>
+          <p:cNvSpPr/>
+          <p:nvPr/>
+        </p:nvSpPr>
+        <p:spPr>
+          <a:xfrm>
+            <a:off x="2418994" y="2100710"/>
+            <a:ext cx="3358955" cy="523220"/>
+          </a:xfrm>
+          <a:prstGeom prst="rect">
+            <a:avLst/>
+          </a:prstGeom>
+          <a:noFill/>
+        </p:spPr>
+        <p:txBody>
+          <a:bodyPr wrap="square" lIns="91440" tIns="45720" rIns="91440" bIns="45720">
+            <a:spAutoFit/>
+          </a:bodyPr>
+          <a:lstStyle/>
           <a:p>
             <a:pPr algn="ctr"/>
             <a:r>
-              <a:rPr lang="de-DE" sz="1200" b="0" cap="none" spc="0" dirty="0">
+              <a:rPr lang="de-DE" sz="2800" dirty="0">
                 <a:ln w="0"/>
                 <a:effectLst>
                   <a:outerShdw blurRad="38100" dist="19050" dir="2700000" algn="tl" rotWithShape="0">
@@ -3626,15 +4012,202 @@
                   </a:outerShdw>
                 </a:effectLst>
               </a:rPr>
-              <a:t>weil Sicherheitslücke!</a:t>
-            </a:r>
+              <a:t>Benutzername</a:t>
+            </a:r>
+            <a:endParaRPr lang="de-DE" sz="2800" b="0" cap="none" spc="0" dirty="0">
+              <a:ln w="0"/>
+              <a:solidFill>
+                <a:schemeClr val="tx1"/>
+              </a:solidFill>
+              <a:effectLst>
+                <a:outerShdw blurRad="38100" dist="19050" dir="2700000" algn="tl" rotWithShape="0">
+                  <a:schemeClr val="dk1">
+                    <a:alpha val="40000"/>
+                  </a:schemeClr>
+                </a:outerShdw>
+              </a:effectLst>
+            </a:endParaRPr>
+          </a:p>
+        </p:txBody>
+      </p:sp>
+      <p:sp>
+        <p:nvSpPr>
+          <p:cNvPr id="27" name="Rechteck 26"/>
+          <p:cNvSpPr/>
+          <p:nvPr/>
+        </p:nvSpPr>
+        <p:spPr>
+          <a:xfrm>
+            <a:off x="2021428" y="3134660"/>
+            <a:ext cx="3358955" cy="523220"/>
+          </a:xfrm>
+          <a:prstGeom prst="rect">
+            <a:avLst/>
+          </a:prstGeom>
+          <a:noFill/>
+        </p:spPr>
+        <p:txBody>
+          <a:bodyPr wrap="square" lIns="91440" tIns="45720" rIns="91440" bIns="45720">
+            <a:spAutoFit/>
+          </a:bodyPr>
+          <a:lstStyle/>
+          <a:p>
+            <a:pPr algn="ctr"/>
+            <a:r>
+              <a:rPr lang="de-DE" sz="2800" dirty="0">
+                <a:ln w="0"/>
+                <a:effectLst>
+                  <a:outerShdw blurRad="38100" dist="19050" dir="2700000" algn="tl" rotWithShape="0">
+                    <a:schemeClr val="dk1">
+                      <a:alpha val="40000"/>
+                    </a:schemeClr>
+                  </a:outerShdw>
+                </a:effectLst>
+              </a:rPr>
+              <a:t>Passwort</a:t>
+            </a:r>
+            <a:endParaRPr lang="de-DE" sz="2800" b="0" cap="none" spc="0" dirty="0">
+              <a:ln w="0"/>
+              <a:solidFill>
+                <a:schemeClr val="tx1"/>
+              </a:solidFill>
+              <a:effectLst>
+                <a:outerShdw blurRad="38100" dist="19050" dir="2700000" algn="tl" rotWithShape="0">
+                  <a:schemeClr val="dk1">
+                    <a:alpha val="40000"/>
+                  </a:schemeClr>
+                </a:outerShdw>
+              </a:effectLst>
+            </a:endParaRPr>
+          </a:p>
+        </p:txBody>
+      </p:sp>
+      <p:sp>
+        <p:nvSpPr>
+          <p:cNvPr id="11" name="Rechteck 10"/>
+          <p:cNvSpPr/>
+          <p:nvPr/>
+        </p:nvSpPr>
+        <p:spPr>
+          <a:xfrm>
+            <a:off x="5777949" y="4293704"/>
+            <a:ext cx="1338468" cy="371061"/>
+          </a:xfrm>
+          <a:prstGeom prst="rect">
+            <a:avLst/>
+          </a:prstGeom>
+          <a:solidFill>
+            <a:srgbClr val="9ABEDF"/>
+          </a:solidFill>
+        </p:spPr>
+        <p:style>
+          <a:lnRef idx="2">
+            <a:schemeClr val="accent1">
+              <a:shade val="50000"/>
+            </a:schemeClr>
+          </a:lnRef>
+          <a:fillRef idx="1">
+            <a:schemeClr val="accent1"/>
+          </a:fillRef>
+          <a:effectRef idx="0">
+            <a:schemeClr val="accent1"/>
+          </a:effectRef>
+          <a:fontRef idx="minor">
+            <a:schemeClr val="lt1"/>
+          </a:fontRef>
+        </p:style>
+        <p:txBody>
+          <a:bodyPr rtlCol="0" anchor="ctr"/>
+          <a:lstStyle/>
+          <a:p>
+            <a:pPr algn="ctr"/>
+            <a:r>
+              <a:rPr lang="de-DE" dirty="0"/>
+              <a:t>Login</a:t>
+            </a:r>
+          </a:p>
+        </p:txBody>
+      </p:sp>
+      <p:pic>
+        <p:nvPicPr>
+          <p:cNvPr id="30" name="Grafik 29"/>
+          <p:cNvPicPr>
+            <a:picLocks noChangeAspect="1"/>
+          </p:cNvPicPr>
+          <p:nvPr/>
+        </p:nvPicPr>
+        <p:blipFill>
+          <a:blip r:embed="rId2">
+            <a:extLst>
+              <a:ext uri="{28A0092B-C50C-407E-A947-70E740481C1C}">
+                <a14:useLocalDpi xmlns:a14="http://schemas.microsoft.com/office/drawing/2010/main" val="0"/>
+              </a:ext>
+            </a:extLst>
+          </a:blip>
+          <a:stretch>
+            <a:fillRect/>
+          </a:stretch>
+        </p:blipFill>
+        <p:spPr>
+          <a:xfrm>
+            <a:off x="210281" y="63397"/>
+            <a:ext cx="1130694" cy="493394"/>
+          </a:xfrm>
+          <a:prstGeom prst="rect">
+            <a:avLst/>
+          </a:prstGeom>
+        </p:spPr>
+      </p:pic>
+      <p:sp>
+        <p:nvSpPr>
+          <p:cNvPr id="31" name="Rechteck 30"/>
+          <p:cNvSpPr/>
+          <p:nvPr/>
+        </p:nvSpPr>
+        <p:spPr>
+          <a:xfrm>
+            <a:off x="1484244" y="0"/>
+            <a:ext cx="10707756" cy="620785"/>
+          </a:xfrm>
+          <a:prstGeom prst="rect">
+            <a:avLst/>
+          </a:prstGeom>
+          <a:solidFill>
+            <a:srgbClr val="9ABEDF"/>
+          </a:solidFill>
+          <a:ln>
+            <a:solidFill>
+              <a:srgbClr val="9ABEDF"/>
+            </a:solidFill>
+          </a:ln>
+        </p:spPr>
+        <p:style>
+          <a:lnRef idx="2">
+            <a:schemeClr val="accent3"/>
+          </a:lnRef>
+          <a:fillRef idx="1">
+            <a:schemeClr val="lt1"/>
+          </a:fillRef>
+          <a:effectRef idx="0">
+            <a:schemeClr val="accent3"/>
+          </a:effectRef>
+          <a:fontRef idx="minor">
+            <a:schemeClr val="dk1"/>
+          </a:fontRef>
+        </p:style>
+        <p:txBody>
+          <a:bodyPr rtlCol="0" anchor="ctr"/>
+          <a:lstStyle/>
+          <a:p>
+            <a:pPr algn="ctr"/>
+            <a:endParaRPr lang="de-DE"/>
           </a:p>
         </p:txBody>
       </p:sp>
     </p:spTree>
     <p:extLst>
       <p:ext uri="{BB962C8B-B14F-4D97-AF65-F5344CB8AC3E}">
-        <p14:creationId xmlns:p14="http://schemas.microsoft.com/office/powerpoint/2010/main" val="2493101858"/>
+        <p14:creationId xmlns:p14="http://schemas.microsoft.com/office/powerpoint/2010/main" val="2037559820"/>
       </p:ext>
     </p:extLst>
   </p:cSld>

</xml_diff>